<commit_message>
Update search in DG
</commit_message>
<xml_diff>
--- a/docs/diagrams/ActivityDiagramSearchCommand.pptx
+++ b/docs/diagrams/ActivityDiagramSearchCommand.pptx
@@ -3645,7 +3645,7 @@
         </p:nvCxnSpPr>
         <p:spPr>
           <a:xfrm>
-            <a:off x="7734182" y="5632648"/>
+            <a:off x="7734182" y="6139898"/>
             <a:ext cx="1843818" cy="0"/>
           </a:xfrm>
           <a:prstGeom prst="straightConnector1">
@@ -3691,8 +3691,8 @@
         </p:nvCxnSpPr>
         <p:spPr>
           <a:xfrm>
-            <a:off x="4547828" y="5632648"/>
-            <a:ext cx="2718302" cy="0"/>
+            <a:off x="4547828" y="6136704"/>
+            <a:ext cx="2718302" cy="3194"/>
           </a:xfrm>
           <a:prstGeom prst="straightConnector1">
             <a:avLst/>
@@ -3738,7 +3738,7 @@
         <p:spPr>
           <a:xfrm>
             <a:off x="7500156" y="3861467"/>
-            <a:ext cx="0" cy="443243"/>
+            <a:ext cx="0" cy="230413"/>
           </a:xfrm>
           <a:prstGeom prst="straightConnector1">
             <a:avLst/>
@@ -3825,7 +3825,7 @@
         </p:nvSpPr>
         <p:spPr>
           <a:xfrm>
-            <a:off x="6220110" y="4304710"/>
+            <a:off x="6220110" y="4091880"/>
             <a:ext cx="2560091" cy="633264"/>
           </a:xfrm>
           <a:prstGeom prst="roundRect">
@@ -3865,7 +3865,7 @@
                   <a:schemeClr val="tx1"/>
                 </a:solidFill>
               </a:rPr>
-              <a:t>Current view list is filtered and updated</a:t>
+              <a:t>Current view list is filtered</a:t>
             </a:r>
           </a:p>
         </p:txBody>
@@ -3885,9 +3885,9 @@
         <p:grpSpPr>
           <a:xfrm>
             <a:off x="1847528" y="3060510"/>
-            <a:ext cx="6840760" cy="2888770"/>
+            <a:ext cx="6840760" cy="3392826"/>
             <a:chOff x="2090606" y="3717032"/>
-            <a:chExt cx="6840760" cy="2888770"/>
+            <a:chExt cx="6840760" cy="3392826"/>
           </a:xfrm>
         </p:grpSpPr>
         <p:sp>
@@ -4001,7 +4001,7 @@
           <p:spPr>
             <a:xfrm>
               <a:off x="3440756" y="4453385"/>
-              <a:ext cx="0" cy="1519153"/>
+              <a:ext cx="0" cy="2023209"/>
             </a:xfrm>
             <a:prstGeom prst="straightConnector1">
               <a:avLst/>
@@ -4128,7 +4128,7 @@
           </p:nvSpPr>
           <p:spPr>
             <a:xfrm>
-              <a:off x="2090606" y="5972538"/>
+              <a:off x="2090606" y="6476594"/>
               <a:ext cx="2700300" cy="633264"/>
             </a:xfrm>
             <a:prstGeom prst="roundRect">
@@ -4287,7 +4287,7 @@
                   <a:schemeClr val="tx1"/>
                 </a:solidFill>
               </a:rPr>
-              <a:t>Creates a predicate to test if an item contains the given keyword(s)</a:t>
+              <a:t>Create a predicate to test if an item contains the given keyword(s)</a:t>
             </a:r>
           </a:p>
         </p:txBody>
@@ -4306,7 +4306,7 @@
         </p:nvSpPr>
         <p:spPr>
           <a:xfrm>
-            <a:off x="7266130" y="5380620"/>
+            <a:off x="7266130" y="5887870"/>
             <a:ext cx="468052" cy="504056"/>
           </a:xfrm>
           <a:prstGeom prst="flowChartDecision">
@@ -4358,7 +4358,7 @@
         </p:nvSpPr>
         <p:spPr>
           <a:xfrm>
-            <a:off x="9578000" y="5452628"/>
+            <a:off x="9578000" y="5959878"/>
             <a:ext cx="360040" cy="360040"/>
           </a:xfrm>
           <a:prstGeom prst="ellipse">
@@ -4405,7 +4405,7 @@
         </p:nvSpPr>
         <p:spPr>
           <a:xfrm>
-            <a:off x="9637668" y="5524636"/>
+            <a:off x="9637668" y="6031886"/>
             <a:ext cx="240704" cy="216024"/>
           </a:xfrm>
           <a:prstGeom prst="ellipse">
@@ -4448,15 +4448,15 @@
           </p:cNvPr>
           <p:cNvCxnSpPr>
             <a:cxnSpLocks/>
-            <a:stCxn id="33" idx="2"/>
+            <a:stCxn id="31" idx="2"/>
             <a:endCxn id="68" idx="0"/>
           </p:cNvCxnSpPr>
           <p:nvPr/>
         </p:nvCxnSpPr>
         <p:spPr>
-          <a:xfrm>
-            <a:off x="7500156" y="4937974"/>
-            <a:ext cx="0" cy="442646"/>
+          <a:xfrm flipH="1">
+            <a:off x="7500156" y="5574432"/>
+            <a:ext cx="9954" cy="313438"/>
           </a:xfrm>
           <a:prstGeom prst="straightConnector1">
             <a:avLst/>
@@ -4580,6 +4580,111 @@
           </a:prstGeom>
           <a:ln>
             <a:prstDash val="sysDash"/>
+          </a:ln>
+        </p:spPr>
+        <p:style>
+          <a:lnRef idx="1">
+            <a:schemeClr val="dk1"/>
+          </a:lnRef>
+          <a:fillRef idx="0">
+            <a:schemeClr val="dk1"/>
+          </a:fillRef>
+          <a:effectRef idx="0">
+            <a:schemeClr val="dk1"/>
+          </a:effectRef>
+          <a:fontRef idx="minor">
+            <a:schemeClr val="tx1"/>
+          </a:fontRef>
+        </p:style>
+      </p:cxnSp>
+      <p:sp>
+        <p:nvSpPr>
+          <p:cNvPr id="31" name="Rounded Rectangle 30">
+            <a:extLst>
+              <a:ext uri="{FF2B5EF4-FFF2-40B4-BE49-F238E27FC236}">
+                <a16:creationId xmlns:a16="http://schemas.microsoft.com/office/drawing/2014/main" id="{7AC0020A-E34D-5043-A867-01F7AED0E167}"/>
+              </a:ext>
+            </a:extLst>
+          </p:cNvPr>
+          <p:cNvSpPr/>
+          <p:nvPr/>
+        </p:nvSpPr>
+        <p:spPr>
+          <a:xfrm>
+            <a:off x="6023992" y="4941168"/>
+            <a:ext cx="2972235" cy="633264"/>
+          </a:xfrm>
+          <a:prstGeom prst="roundRect">
+            <a:avLst/>
+          </a:prstGeom>
+          <a:noFill/>
+          <a:ln>
+            <a:solidFill>
+              <a:schemeClr val="tx1"/>
+            </a:solidFill>
+          </a:ln>
+        </p:spPr>
+        <p:style>
+          <a:lnRef idx="2">
+            <a:schemeClr val="accent1">
+              <a:shade val="50000"/>
+            </a:schemeClr>
+          </a:lnRef>
+          <a:fillRef idx="1">
+            <a:schemeClr val="accent1"/>
+          </a:fillRef>
+          <a:effectRef idx="0">
+            <a:schemeClr val="accent1"/>
+          </a:effectRef>
+          <a:fontRef idx="minor">
+            <a:schemeClr val="lt1"/>
+          </a:fontRef>
+        </p:style>
+        <p:txBody>
+          <a:bodyPr rtlCol="0" anchor="ctr"/>
+          <a:lstStyle/>
+          <a:p>
+            <a:pPr algn="ctr"/>
+            <a:r>
+              <a:rPr lang="en-US" dirty="0">
+                <a:solidFill>
+                  <a:schemeClr val="tx1"/>
+                </a:solidFill>
+              </a:rPr>
+              <a:t>Feedback to user that the current view list is updated.</a:t>
+            </a:r>
+          </a:p>
+        </p:txBody>
+      </p:sp>
+      <p:cxnSp>
+        <p:nvCxnSpPr>
+          <p:cNvPr id="32" name="Straight Arrow Connector 31">
+            <a:extLst>
+              <a:ext uri="{FF2B5EF4-FFF2-40B4-BE49-F238E27FC236}">
+                <a16:creationId xmlns:a16="http://schemas.microsoft.com/office/drawing/2014/main" id="{3398B745-1A8E-7841-8A31-F3A00DEE1E30}"/>
+              </a:ext>
+            </a:extLst>
+          </p:cNvPr>
+          <p:cNvCxnSpPr>
+            <a:cxnSpLocks/>
+            <a:stCxn id="33" idx="2"/>
+            <a:endCxn id="31" idx="0"/>
+          </p:cNvCxnSpPr>
+          <p:nvPr/>
+        </p:nvCxnSpPr>
+        <p:spPr>
+          <a:xfrm>
+            <a:off x="7500156" y="4725144"/>
+            <a:ext cx="9954" cy="216024"/>
+          </a:xfrm>
+          <a:prstGeom prst="straightConnector1">
+            <a:avLst/>
+          </a:prstGeom>
+          <a:ln w="38100">
+            <a:solidFill>
+              <a:schemeClr val="tx1"/>
+            </a:solidFill>
+            <a:tailEnd type="triangle"/>
           </a:ln>
         </p:spPr>
         <p:style>

</xml_diff>